<commit_message>
Tweak the HSLF and XSLF tests for master slide text to cover more (some of which is disabled for now)
git-svn-id: https://svn.apache.org/repos/asf/poi/trunk@1175870 13f79535-47bb-0310-9956-ffa450edef68
</commit_message>
<xml_diff>
--- a/test-data/slideshow/WithMaster.pptx
+++ b/test-data/slideshow/WithMaster.pptx
@@ -5,10 +5,11 @@
     <p:sldMasterId id="2147483648" r:id="rId1"/>
   </p:sldMasterIdLst>
   <p:notesMasterIdLst>
-    <p:notesMasterId r:id="rId3"/>
+    <p:notesMasterId r:id="rId4"/>
   </p:notesMasterIdLst>
   <p:sldIdLst>
     <p:sldId id="256" r:id="rId2"/>
+    <p:sldId id="257" r:id="rId3"/>
   </p:sldIdLst>
   <p:sldSz cx="9144000" cy="6858000" type="screen4x3"/>
   <p:notesSz cx="6858000" cy="9144000"/>
@@ -16,122 +17,92 @@
     <a:defPPr>
       <a:defRPr lang="en-US"/>
     </a:defPPr>
-    <a:lvl1pPr algn="l" rtl="0" fontAlgn="base">
-      <a:spcBef>
-        <a:spcPct val="0"/>
-      </a:spcBef>
-      <a:spcAft>
-        <a:spcPct val="0"/>
-      </a:spcAft>
-      <a:defRPr kern="1200">
+    <a:lvl1pPr marL="0" algn="l" defTabSz="914400" rtl="0" eaLnBrk="1" latinLnBrk="0" hangingPunct="1">
+      <a:defRPr sz="1800" kern="1200">
         <a:solidFill>
           <a:schemeClr val="tx1"/>
         </a:solidFill>
-        <a:latin typeface="Arial" charset="0"/>
+        <a:latin typeface="+mn-lt"/>
         <a:ea typeface="+mn-ea"/>
         <a:cs typeface="+mn-cs"/>
       </a:defRPr>
     </a:lvl1pPr>
-    <a:lvl2pPr marL="457200" algn="l" rtl="0" fontAlgn="base">
-      <a:spcBef>
-        <a:spcPct val="0"/>
-      </a:spcBef>
-      <a:spcAft>
-        <a:spcPct val="0"/>
-      </a:spcAft>
-      <a:defRPr kern="1200">
+    <a:lvl2pPr marL="457200" algn="l" defTabSz="914400" rtl="0" eaLnBrk="1" latinLnBrk="0" hangingPunct="1">
+      <a:defRPr sz="1800" kern="1200">
         <a:solidFill>
           <a:schemeClr val="tx1"/>
         </a:solidFill>
-        <a:latin typeface="Arial" charset="0"/>
+        <a:latin typeface="+mn-lt"/>
         <a:ea typeface="+mn-ea"/>
         <a:cs typeface="+mn-cs"/>
       </a:defRPr>
     </a:lvl2pPr>
-    <a:lvl3pPr marL="914400" algn="l" rtl="0" fontAlgn="base">
-      <a:spcBef>
-        <a:spcPct val="0"/>
-      </a:spcBef>
-      <a:spcAft>
-        <a:spcPct val="0"/>
-      </a:spcAft>
-      <a:defRPr kern="1200">
+    <a:lvl3pPr marL="914400" algn="l" defTabSz="914400" rtl="0" eaLnBrk="1" latinLnBrk="0" hangingPunct="1">
+      <a:defRPr sz="1800" kern="1200">
         <a:solidFill>
           <a:schemeClr val="tx1"/>
         </a:solidFill>
-        <a:latin typeface="Arial" charset="0"/>
+        <a:latin typeface="+mn-lt"/>
         <a:ea typeface="+mn-ea"/>
         <a:cs typeface="+mn-cs"/>
       </a:defRPr>
     </a:lvl3pPr>
-    <a:lvl4pPr marL="1371600" algn="l" rtl="0" fontAlgn="base">
-      <a:spcBef>
-        <a:spcPct val="0"/>
-      </a:spcBef>
-      <a:spcAft>
-        <a:spcPct val="0"/>
-      </a:spcAft>
-      <a:defRPr kern="1200">
+    <a:lvl4pPr marL="1371600" algn="l" defTabSz="914400" rtl="0" eaLnBrk="1" latinLnBrk="0" hangingPunct="1">
+      <a:defRPr sz="1800" kern="1200">
         <a:solidFill>
           <a:schemeClr val="tx1"/>
         </a:solidFill>
-        <a:latin typeface="Arial" charset="0"/>
+        <a:latin typeface="+mn-lt"/>
         <a:ea typeface="+mn-ea"/>
         <a:cs typeface="+mn-cs"/>
       </a:defRPr>
     </a:lvl4pPr>
-    <a:lvl5pPr marL="1828800" algn="l" rtl="0" fontAlgn="base">
-      <a:spcBef>
-        <a:spcPct val="0"/>
-      </a:spcBef>
-      <a:spcAft>
-        <a:spcPct val="0"/>
-      </a:spcAft>
-      <a:defRPr kern="1200">
+    <a:lvl5pPr marL="1828800" algn="l" defTabSz="914400" rtl="0" eaLnBrk="1" latinLnBrk="0" hangingPunct="1">
+      <a:defRPr sz="1800" kern="1200">
         <a:solidFill>
           <a:schemeClr val="tx1"/>
         </a:solidFill>
-        <a:latin typeface="Arial" charset="0"/>
+        <a:latin typeface="+mn-lt"/>
         <a:ea typeface="+mn-ea"/>
         <a:cs typeface="+mn-cs"/>
       </a:defRPr>
     </a:lvl5pPr>
     <a:lvl6pPr marL="2286000" algn="l" defTabSz="914400" rtl="0" eaLnBrk="1" latinLnBrk="0" hangingPunct="1">
-      <a:defRPr kern="1200">
+      <a:defRPr sz="1800" kern="1200">
         <a:solidFill>
           <a:schemeClr val="tx1"/>
         </a:solidFill>
-        <a:latin typeface="Arial" charset="0"/>
+        <a:latin typeface="+mn-lt"/>
         <a:ea typeface="+mn-ea"/>
         <a:cs typeface="+mn-cs"/>
       </a:defRPr>
     </a:lvl6pPr>
     <a:lvl7pPr marL="2743200" algn="l" defTabSz="914400" rtl="0" eaLnBrk="1" latinLnBrk="0" hangingPunct="1">
-      <a:defRPr kern="1200">
+      <a:defRPr sz="1800" kern="1200">
         <a:solidFill>
           <a:schemeClr val="tx1"/>
         </a:solidFill>
-        <a:latin typeface="Arial" charset="0"/>
+        <a:latin typeface="+mn-lt"/>
         <a:ea typeface="+mn-ea"/>
         <a:cs typeface="+mn-cs"/>
       </a:defRPr>
     </a:lvl7pPr>
     <a:lvl8pPr marL="3200400" algn="l" defTabSz="914400" rtl="0" eaLnBrk="1" latinLnBrk="0" hangingPunct="1">
-      <a:defRPr kern="1200">
+      <a:defRPr sz="1800" kern="1200">
         <a:solidFill>
           <a:schemeClr val="tx1"/>
         </a:solidFill>
-        <a:latin typeface="Arial" charset="0"/>
+        <a:latin typeface="+mn-lt"/>
         <a:ea typeface="+mn-ea"/>
         <a:cs typeface="+mn-cs"/>
       </a:defRPr>
     </a:lvl8pPr>
     <a:lvl9pPr marL="3657600" algn="l" defTabSz="914400" rtl="0" eaLnBrk="1" latinLnBrk="0" hangingPunct="1">
-      <a:defRPr kern="1200">
+      <a:defRPr sz="1800" kern="1200">
         <a:solidFill>
           <a:schemeClr val="tx1"/>
         </a:solidFill>
-        <a:latin typeface="Arial" charset="0"/>
+        <a:latin typeface="+mn-lt"/>
         <a:ea typeface="+mn-ea"/>
         <a:cs typeface="+mn-cs"/>
       </a:defRPr>
@@ -220,9 +191,9 @@
             </a:lvl1pPr>
           </a:lstStyle>
           <a:p>
-            <a:fld id="{C5DBE85B-656C-48CF-A7F9-C8029822CC09}" type="datetimeFigureOut">
-              <a:rPr lang="en-US" smtClean="0"/>
-              <a:t>9/13/2011</a:t>
+            <a:fld id="{CE814FD6-FFE1-44FC-A910-A6817415A713}" type="datetimeFigureOut">
+              <a:rPr lang="en-US" smtClean="0"/>
+              <a:t>9/26/2011</a:t>
             </a:fld>
             <a:endParaRPr lang="en-US"/>
           </a:p>
@@ -281,9 +252,7 @@
           </a:prstGeom>
         </p:spPr>
         <p:txBody>
-          <a:bodyPr vert="horz" lIns="91440" tIns="45720" rIns="91440" bIns="45720" rtlCol="0">
-            <a:normAutofit/>
-          </a:bodyPr>
+          <a:bodyPr vert="horz" lIns="91440" tIns="45720" rIns="91440" bIns="45720" rtlCol="0"/>
           <a:lstStyle/>
           <a:p>
             <a:pPr lvl="0"/>
@@ -381,7 +350,7 @@
             </a:lvl1pPr>
           </a:lstStyle>
           <a:p>
-            <a:fld id="{22694F68-3141-45E4-AAE5-8002C377AB0F}" type="slidenum">
+            <a:fld id="{C605787F-3C1C-4323-9387-443C094C22D1}" type="slidenum">
               <a:rPr lang="en-US" smtClean="0"/>
               <a:t>‹#›</a:t>
             </a:fld>
@@ -390,6 +359,11 @@
         </p:txBody>
       </p:sp>
     </p:spTree>
+    <p:extLst>
+      <p:ext uri="{BB962C8B-B14F-4D97-AF65-F5344CB8AC3E}">
+        <p14:creationId xmlns:p14="http://schemas.microsoft.com/office/powerpoint/2010/main" val="33116209"/>
+      </p:ext>
+    </p:extLst>
   </p:cSld>
   <p:clrMap bg1="lt1" tx1="dk1" bg2="lt2" tx2="dk2" accent1="accent1" accent2="accent2" accent3="accent3" accent4="accent4" accent5="accent5" accent6="accent6" hlink="hlink" folHlink="folHlink"/>
   <p:notesStyle>
@@ -511,24 +485,28 @@
             <a:spLocks noGrp="1"/>
           </p:cNvSpPr>
           <p:nvPr>
-            <p:ph type="ctrTitle"/>
+            <p:ph type="ctrTitle" hasCustomPrompt="1"/>
           </p:nvPr>
         </p:nvSpPr>
         <p:spPr>
           <a:xfrm>
-            <a:off x="685800" y="2130425"/>
+            <a:off x="762000" y="457200"/>
             <a:ext cx="7772400" cy="1470025"/>
           </a:xfrm>
         </p:spPr>
         <p:txBody>
           <a:bodyPr/>
-          <a:lstStyle/>
-          <a:p>
-            <a:r>
-              <a:rPr lang="en-US" smtClean="0"/>
-              <a:t>Click to edit Master title style</a:t>
-            </a:r>
-            <a:endParaRPr lang="en-US"/>
+          <a:lstStyle>
+            <a:lvl1pPr>
+              <a:defRPr/>
+            </a:lvl1pPr>
+          </a:lstStyle>
+          <a:p>
+            <a:r>
+              <a:rPr lang="en-US" dirty="0" smtClean="0"/>
+              <a:t>This is the Master Title</a:t>
+            </a:r>
+            <a:endParaRPr lang="en-US" dirty="0"/>
           </a:p>
         </p:txBody>
       </p:sp>
@@ -553,7 +531,7 @@
           <a:lstStyle>
             <a:lvl1pPr marL="0" indent="0" algn="ctr">
               <a:buNone/>
-              <a:defRPr>
+              <a:defRPr b="1" i="1" baseline="0">
                 <a:solidFill>
                   <a:schemeClr val="tx1">
                     <a:tint val="75000"/>
@@ -643,11 +621,17 @@
             </a:lvl9pPr>
           </a:lstStyle>
           <a:p>
-            <a:r>
-              <a:rPr lang="en-US" smtClean="0"/>
-              <a:t>Click to edit Master subtitle style</a:t>
-            </a:r>
-            <a:endParaRPr lang="en-US"/>
+            <a:endParaRPr lang="en-GB" dirty="0" smtClean="0"/>
+          </a:p>
+          <a:p>
+            <a:endParaRPr lang="en-GB" dirty="0" smtClean="0"/>
+          </a:p>
+          <a:p>
+            <a:r>
+              <a:rPr lang="en-GB" dirty="0" smtClean="0"/>
+              <a:t>Master subtitle text</a:t>
+            </a:r>
+            <a:endParaRPr lang="en-US" dirty="0"/>
           </a:p>
         </p:txBody>
       </p:sp>
@@ -664,18 +648,11 @@
         <p:spPr/>
         <p:txBody>
           <a:bodyPr/>
-          <a:lstStyle>
-            <a:lvl1pPr>
-              <a:defRPr/>
-            </a:lvl1pPr>
-          </a:lstStyle>
-          <a:p>
-            <a:pPr>
-              <a:defRPr/>
-            </a:pPr>
-            <a:fld id="{564083D9-2D75-4B17-8182-C1918B5C4E83}" type="datetime1">
-              <a:rPr lang="en-US" smtClean="0"/>
-              <a:t>9/13/2011</a:t>
+          <a:lstStyle/>
+          <a:p>
+            <a:fld id="{254917ED-3EAA-406D-A3BB-AEF6E130108E}" type="datetimeFigureOut">
+              <a:rPr lang="en-US" smtClean="0"/>
+              <a:t>9/26/2011</a:t>
             </a:fld>
             <a:endParaRPr lang="en-US"/>
           </a:p>
@@ -694,19 +671,13 @@
         <p:spPr/>
         <p:txBody>
           <a:bodyPr/>
-          <a:lstStyle>
-            <a:lvl1pPr>
-              <a:defRPr dirty="0"/>
-            </a:lvl1pPr>
-          </a:lstStyle>
-          <a:p>
-            <a:pPr>
-              <a:defRPr/>
-            </a:pPr>
-            <a:r>
-              <a:rPr lang="en-US"/>
-              <a:t>Master footer is here</a:t>
-            </a:r>
+          <a:lstStyle/>
+          <a:p>
+            <a:r>
+              <a:rPr lang="en-GB" dirty="0" smtClean="0"/>
+              <a:t>Footer from the master slide</a:t>
+            </a:r>
+            <a:endParaRPr lang="en-US" dirty="0"/>
           </a:p>
         </p:txBody>
       </p:sp>
@@ -723,27 +694,60 @@
         <p:spPr/>
         <p:txBody>
           <a:bodyPr/>
-          <a:lstStyle>
-            <a:lvl1pPr>
-              <a:defRPr/>
-            </a:lvl1pPr>
-          </a:lstStyle>
-          <a:p>
-            <a:pPr>
-              <a:defRPr/>
-            </a:pPr>
-            <a:fld id="{B0722C95-8C6C-49E1-A79E-519BEBA6C776}" type="slidenum">
-              <a:rPr lang="en-US"/>
-              <a:pPr>
-                <a:defRPr/>
-              </a:pPr>
+          <a:lstStyle/>
+          <a:p>
+            <a:fld id="{B6A70819-7E63-4C0C-BF11-645F18DC92FF}" type="slidenum">
+              <a:rPr lang="en-US" smtClean="0"/>
               <a:t>‹#›</a:t>
             </a:fld>
             <a:endParaRPr lang="en-US"/>
           </a:p>
         </p:txBody>
       </p:sp>
+      <p:sp>
+        <p:nvSpPr>
+          <p:cNvPr id="7" name="TextBox 6"/>
+          <p:cNvSpPr txBox="1"/>
+          <p:nvPr userDrawn="1"/>
+        </p:nvSpPr>
+        <p:spPr>
+          <a:xfrm>
+            <a:off x="381000" y="2438400"/>
+            <a:ext cx="8534400" cy="646331"/>
+          </a:xfrm>
+          <a:prstGeom prst="rect">
+            <a:avLst/>
+          </a:prstGeom>
+          <a:noFill/>
+        </p:spPr>
+        <p:txBody>
+          <a:bodyPr wrap="square" rtlCol="0">
+            <a:spAutoFit/>
+          </a:bodyPr>
+          <a:lstStyle/>
+          <a:p>
+            <a:r>
+              <a:rPr lang="en-GB" sz="3600" dirty="0" smtClean="0">
+                <a:solidFill>
+                  <a:srgbClr val="92D050"/>
+                </a:solidFill>
+              </a:rPr>
+              <a:t>This text comes from the Master Slide</a:t>
+            </a:r>
+            <a:endParaRPr lang="en-US" sz="3600" dirty="0">
+              <a:solidFill>
+                <a:srgbClr val="92D050"/>
+              </a:solidFill>
+            </a:endParaRPr>
+          </a:p>
+        </p:txBody>
+      </p:sp>
     </p:spTree>
+    <p:extLst>
+      <p:ext uri="{BB962C8B-B14F-4D97-AF65-F5344CB8AC3E}">
+        <p14:creationId xmlns:p14="http://schemas.microsoft.com/office/powerpoint/2010/main" val="4194695664"/>
+      </p:ext>
+    </p:extLst>
   </p:cSld>
   <p:clrMapOvr>
     <a:masterClrMapping/>
@@ -856,18 +860,11 @@
         <p:spPr/>
         <p:txBody>
           <a:bodyPr/>
-          <a:lstStyle>
-            <a:lvl1pPr>
-              <a:defRPr/>
-            </a:lvl1pPr>
-          </a:lstStyle>
-          <a:p>
-            <a:pPr>
-              <a:defRPr/>
-            </a:pPr>
-            <a:fld id="{80F12F4B-C644-4CBD-AFDD-6C111C217797}" type="datetime1">
-              <a:rPr lang="en-US" smtClean="0"/>
-              <a:t>9/13/2011</a:t>
+          <a:lstStyle/>
+          <a:p>
+            <a:fld id="{254917ED-3EAA-406D-A3BB-AEF6E130108E}" type="datetimeFigureOut">
+              <a:rPr lang="en-US" smtClean="0"/>
+              <a:t>9/26/2011</a:t>
             </a:fld>
             <a:endParaRPr lang="en-US"/>
           </a:p>
@@ -886,19 +883,8 @@
         <p:spPr/>
         <p:txBody>
           <a:bodyPr/>
-          <a:lstStyle>
-            <a:lvl1pPr>
-              <a:defRPr/>
-            </a:lvl1pPr>
-          </a:lstStyle>
-          <a:p>
-            <a:pPr>
-              <a:defRPr/>
-            </a:pPr>
-            <a:r>
-              <a:rPr lang="en-US" smtClean="0"/>
-              <a:t>Master footer is here</a:t>
-            </a:r>
+          <a:lstStyle/>
+          <a:p>
             <a:endParaRPr lang="en-US"/>
           </a:p>
         </p:txBody>
@@ -916,20 +902,10 @@
         <p:spPr/>
         <p:txBody>
           <a:bodyPr/>
-          <a:lstStyle>
-            <a:lvl1pPr>
-              <a:defRPr/>
-            </a:lvl1pPr>
-          </a:lstStyle>
-          <a:p>
-            <a:pPr>
-              <a:defRPr/>
-            </a:pPr>
-            <a:fld id="{528171BE-AA9C-4D07-A114-03B95442D392}" type="slidenum">
-              <a:rPr lang="en-US"/>
-              <a:pPr>
-                <a:defRPr/>
-              </a:pPr>
+          <a:lstStyle/>
+          <a:p>
+            <a:fld id="{B6A70819-7E63-4C0C-BF11-645F18DC92FF}" type="slidenum">
+              <a:rPr lang="en-US" smtClean="0"/>
               <a:t>‹#›</a:t>
             </a:fld>
             <a:endParaRPr lang="en-US"/>
@@ -937,6 +913,11 @@
         </p:txBody>
       </p:sp>
     </p:spTree>
+    <p:extLst>
+      <p:ext uri="{BB962C8B-B14F-4D97-AF65-F5344CB8AC3E}">
+        <p14:creationId xmlns:p14="http://schemas.microsoft.com/office/powerpoint/2010/main" val="1026125312"/>
+      </p:ext>
+    </p:extLst>
   </p:cSld>
   <p:clrMapOvr>
     <a:masterClrMapping/>
@@ -1059,18 +1040,11 @@
         <p:spPr/>
         <p:txBody>
           <a:bodyPr/>
-          <a:lstStyle>
-            <a:lvl1pPr>
-              <a:defRPr/>
-            </a:lvl1pPr>
-          </a:lstStyle>
-          <a:p>
-            <a:pPr>
-              <a:defRPr/>
-            </a:pPr>
-            <a:fld id="{8C249E84-7AC0-4001-9E7D-A43670B3DC1E}" type="datetime1">
-              <a:rPr lang="en-US" smtClean="0"/>
-              <a:t>9/13/2011</a:t>
+          <a:lstStyle/>
+          <a:p>
+            <a:fld id="{254917ED-3EAA-406D-A3BB-AEF6E130108E}" type="datetimeFigureOut">
+              <a:rPr lang="en-US" smtClean="0"/>
+              <a:t>9/26/2011</a:t>
             </a:fld>
             <a:endParaRPr lang="en-US"/>
           </a:p>
@@ -1089,19 +1063,8 @@
         <p:spPr/>
         <p:txBody>
           <a:bodyPr/>
-          <a:lstStyle>
-            <a:lvl1pPr>
-              <a:defRPr/>
-            </a:lvl1pPr>
-          </a:lstStyle>
-          <a:p>
-            <a:pPr>
-              <a:defRPr/>
-            </a:pPr>
-            <a:r>
-              <a:rPr lang="en-US" smtClean="0"/>
-              <a:t>Master footer is here</a:t>
-            </a:r>
+          <a:lstStyle/>
+          <a:p>
             <a:endParaRPr lang="en-US"/>
           </a:p>
         </p:txBody>
@@ -1119,20 +1082,10 @@
         <p:spPr/>
         <p:txBody>
           <a:bodyPr/>
-          <a:lstStyle>
-            <a:lvl1pPr>
-              <a:defRPr/>
-            </a:lvl1pPr>
-          </a:lstStyle>
-          <a:p>
-            <a:pPr>
-              <a:defRPr/>
-            </a:pPr>
-            <a:fld id="{13B1B82B-1007-4574-83DC-1D01BE6E9918}" type="slidenum">
-              <a:rPr lang="en-US"/>
-              <a:pPr>
-                <a:defRPr/>
-              </a:pPr>
+          <a:lstStyle/>
+          <a:p>
+            <a:fld id="{B6A70819-7E63-4C0C-BF11-645F18DC92FF}" type="slidenum">
+              <a:rPr lang="en-US" smtClean="0"/>
               <a:t>‹#›</a:t>
             </a:fld>
             <a:endParaRPr lang="en-US"/>
@@ -1140,6 +1093,11 @@
         </p:txBody>
       </p:sp>
     </p:spTree>
+    <p:extLst>
+      <p:ext uri="{BB962C8B-B14F-4D97-AF65-F5344CB8AC3E}">
+        <p14:creationId xmlns:p14="http://schemas.microsoft.com/office/powerpoint/2010/main" val="917445702"/>
+      </p:ext>
+    </p:extLst>
   </p:cSld>
   <p:clrMapOvr>
     <a:masterClrMapping/>
@@ -1252,18 +1210,11 @@
         <p:spPr/>
         <p:txBody>
           <a:bodyPr/>
-          <a:lstStyle>
-            <a:lvl1pPr>
-              <a:defRPr/>
-            </a:lvl1pPr>
-          </a:lstStyle>
-          <a:p>
-            <a:pPr>
-              <a:defRPr/>
-            </a:pPr>
-            <a:fld id="{CD410033-3E4A-4526-BB91-2455B99CECE9}" type="datetime1">
-              <a:rPr lang="en-US" smtClean="0"/>
-              <a:t>9/13/2011</a:t>
+          <a:lstStyle/>
+          <a:p>
+            <a:fld id="{254917ED-3EAA-406D-A3BB-AEF6E130108E}" type="datetimeFigureOut">
+              <a:rPr lang="en-US" smtClean="0"/>
+              <a:t>9/26/2011</a:t>
             </a:fld>
             <a:endParaRPr lang="en-US"/>
           </a:p>
@@ -1282,19 +1233,8 @@
         <p:spPr/>
         <p:txBody>
           <a:bodyPr/>
-          <a:lstStyle>
-            <a:lvl1pPr>
-              <a:defRPr/>
-            </a:lvl1pPr>
-          </a:lstStyle>
-          <a:p>
-            <a:pPr>
-              <a:defRPr/>
-            </a:pPr>
-            <a:r>
-              <a:rPr lang="en-US" smtClean="0"/>
-              <a:t>Master footer is here</a:t>
-            </a:r>
+          <a:lstStyle/>
+          <a:p>
             <a:endParaRPr lang="en-US"/>
           </a:p>
         </p:txBody>
@@ -1312,20 +1252,10 @@
         <p:spPr/>
         <p:txBody>
           <a:bodyPr/>
-          <a:lstStyle>
-            <a:lvl1pPr>
-              <a:defRPr/>
-            </a:lvl1pPr>
-          </a:lstStyle>
-          <a:p>
-            <a:pPr>
-              <a:defRPr/>
-            </a:pPr>
-            <a:fld id="{DA9F718F-27AB-423B-8175-98E4A33C3C9B}" type="slidenum">
-              <a:rPr lang="en-US"/>
-              <a:pPr>
-                <a:defRPr/>
-              </a:pPr>
+          <a:lstStyle/>
+          <a:p>
+            <a:fld id="{B6A70819-7E63-4C0C-BF11-645F18DC92FF}" type="slidenum">
+              <a:rPr lang="en-US" smtClean="0"/>
               <a:t>‹#›</a:t>
             </a:fld>
             <a:endParaRPr lang="en-US"/>
@@ -1333,6 +1263,11 @@
         </p:txBody>
       </p:sp>
     </p:spTree>
+    <p:extLst>
+      <p:ext uri="{BB962C8B-B14F-4D97-AF65-F5344CB8AC3E}">
+        <p14:creationId xmlns:p14="http://schemas.microsoft.com/office/powerpoint/2010/main" val="1527207188"/>
+      </p:ext>
+    </p:extLst>
   </p:cSld>
   <p:clrMapOvr>
     <a:masterClrMapping/>
@@ -1521,18 +1456,11 @@
         <p:spPr/>
         <p:txBody>
           <a:bodyPr/>
-          <a:lstStyle>
-            <a:lvl1pPr>
-              <a:defRPr/>
-            </a:lvl1pPr>
-          </a:lstStyle>
-          <a:p>
-            <a:pPr>
-              <a:defRPr/>
-            </a:pPr>
-            <a:fld id="{ED3F04B5-FFE5-4E49-B965-A3EA5095E235}" type="datetime1">
-              <a:rPr lang="en-US" smtClean="0"/>
-              <a:t>9/13/2011</a:t>
+          <a:lstStyle/>
+          <a:p>
+            <a:fld id="{254917ED-3EAA-406D-A3BB-AEF6E130108E}" type="datetimeFigureOut">
+              <a:rPr lang="en-US" smtClean="0"/>
+              <a:t>9/26/2011</a:t>
             </a:fld>
             <a:endParaRPr lang="en-US"/>
           </a:p>
@@ -1551,19 +1479,8 @@
         <p:spPr/>
         <p:txBody>
           <a:bodyPr/>
-          <a:lstStyle>
-            <a:lvl1pPr>
-              <a:defRPr/>
-            </a:lvl1pPr>
-          </a:lstStyle>
-          <a:p>
-            <a:pPr>
-              <a:defRPr/>
-            </a:pPr>
-            <a:r>
-              <a:rPr lang="en-US" smtClean="0"/>
-              <a:t>Master footer is here</a:t>
-            </a:r>
+          <a:lstStyle/>
+          <a:p>
             <a:endParaRPr lang="en-US"/>
           </a:p>
         </p:txBody>
@@ -1581,20 +1498,10 @@
         <p:spPr/>
         <p:txBody>
           <a:bodyPr/>
-          <a:lstStyle>
-            <a:lvl1pPr>
-              <a:defRPr/>
-            </a:lvl1pPr>
-          </a:lstStyle>
-          <a:p>
-            <a:pPr>
-              <a:defRPr/>
-            </a:pPr>
-            <a:fld id="{DC292329-270E-4EE3-8617-C76E9EE901C7}" type="slidenum">
-              <a:rPr lang="en-US"/>
-              <a:pPr>
-                <a:defRPr/>
-              </a:pPr>
+          <a:lstStyle/>
+          <a:p>
+            <a:fld id="{B6A70819-7E63-4C0C-BF11-645F18DC92FF}" type="slidenum">
+              <a:rPr lang="en-US" smtClean="0"/>
               <a:t>‹#›</a:t>
             </a:fld>
             <a:endParaRPr lang="en-US"/>
@@ -1602,6 +1509,11 @@
         </p:txBody>
       </p:sp>
     </p:spTree>
+    <p:extLst>
+      <p:ext uri="{BB962C8B-B14F-4D97-AF65-F5344CB8AC3E}">
+        <p14:creationId xmlns:p14="http://schemas.microsoft.com/office/powerpoint/2010/main" val="3890694762"/>
+      </p:ext>
+    </p:extLst>
   </p:cSld>
   <p:clrMapOvr>
     <a:masterClrMapping/>
@@ -1821,7 +1733,7 @@
       </p:sp>
       <p:sp>
         <p:nvSpPr>
-          <p:cNvPr id="5" name="Date Placeholder 3"/>
+          <p:cNvPr id="5" name="Date Placeholder 4"/>
           <p:cNvSpPr>
             <a:spLocks noGrp="1"/>
           </p:cNvSpPr>
@@ -1832,18 +1744,11 @@
         <p:spPr/>
         <p:txBody>
           <a:bodyPr/>
-          <a:lstStyle>
-            <a:lvl1pPr>
-              <a:defRPr/>
-            </a:lvl1pPr>
-          </a:lstStyle>
-          <a:p>
-            <a:pPr>
-              <a:defRPr/>
-            </a:pPr>
-            <a:fld id="{ABE643BD-4777-4AAF-8B19-0818054A24DB}" type="datetime1">
-              <a:rPr lang="en-US" smtClean="0"/>
-              <a:t>9/13/2011</a:t>
+          <a:lstStyle/>
+          <a:p>
+            <a:fld id="{254917ED-3EAA-406D-A3BB-AEF6E130108E}" type="datetimeFigureOut">
+              <a:rPr lang="en-US" smtClean="0"/>
+              <a:t>9/26/2011</a:t>
             </a:fld>
             <a:endParaRPr lang="en-US"/>
           </a:p>
@@ -1851,7 +1756,7 @@
       </p:sp>
       <p:sp>
         <p:nvSpPr>
-          <p:cNvPr id="6" name="Footer Placeholder 4"/>
+          <p:cNvPr id="6" name="Footer Placeholder 5"/>
           <p:cNvSpPr>
             <a:spLocks noGrp="1"/>
           </p:cNvSpPr>
@@ -1862,26 +1767,15 @@
         <p:spPr/>
         <p:txBody>
           <a:bodyPr/>
-          <a:lstStyle>
-            <a:lvl1pPr>
-              <a:defRPr/>
-            </a:lvl1pPr>
-          </a:lstStyle>
-          <a:p>
-            <a:pPr>
-              <a:defRPr/>
-            </a:pPr>
-            <a:r>
-              <a:rPr lang="en-US" smtClean="0"/>
-              <a:t>Master footer is here</a:t>
-            </a:r>
-            <a:endParaRPr lang="en-US"/>
-          </a:p>
-        </p:txBody>
-      </p:sp>
-      <p:sp>
-        <p:nvSpPr>
-          <p:cNvPr id="7" name="Slide Number Placeholder 5"/>
+          <a:lstStyle/>
+          <a:p>
+            <a:endParaRPr lang="en-US"/>
+          </a:p>
+        </p:txBody>
+      </p:sp>
+      <p:sp>
+        <p:nvSpPr>
+          <p:cNvPr id="7" name="Slide Number Placeholder 6"/>
           <p:cNvSpPr>
             <a:spLocks noGrp="1"/>
           </p:cNvSpPr>
@@ -1892,20 +1786,10 @@
         <p:spPr/>
         <p:txBody>
           <a:bodyPr/>
-          <a:lstStyle>
-            <a:lvl1pPr>
-              <a:defRPr/>
-            </a:lvl1pPr>
-          </a:lstStyle>
-          <a:p>
-            <a:pPr>
-              <a:defRPr/>
-            </a:pPr>
-            <a:fld id="{896E544D-7C59-4EA1-8096-7268C38017E3}" type="slidenum">
-              <a:rPr lang="en-US"/>
-              <a:pPr>
-                <a:defRPr/>
-              </a:pPr>
+          <a:lstStyle/>
+          <a:p>
+            <a:fld id="{B6A70819-7E63-4C0C-BF11-645F18DC92FF}" type="slidenum">
+              <a:rPr lang="en-US" smtClean="0"/>
               <a:t>‹#›</a:t>
             </a:fld>
             <a:endParaRPr lang="en-US"/>
@@ -1913,6 +1797,11 @@
         </p:txBody>
       </p:sp>
     </p:spTree>
+    <p:extLst>
+      <p:ext uri="{BB962C8B-B14F-4D97-AF65-F5344CB8AC3E}">
+        <p14:creationId xmlns:p14="http://schemas.microsoft.com/office/powerpoint/2010/main" val="2131835347"/>
+      </p:ext>
+    </p:extLst>
   </p:cSld>
   <p:clrMapOvr>
     <a:masterClrMapping/>
@@ -2266,7 +2155,7 @@
       </p:sp>
       <p:sp>
         <p:nvSpPr>
-          <p:cNvPr id="7" name="Date Placeholder 3"/>
+          <p:cNvPr id="7" name="Date Placeholder 6"/>
           <p:cNvSpPr>
             <a:spLocks noGrp="1"/>
           </p:cNvSpPr>
@@ -2277,18 +2166,11 @@
         <p:spPr/>
         <p:txBody>
           <a:bodyPr/>
-          <a:lstStyle>
-            <a:lvl1pPr>
-              <a:defRPr/>
-            </a:lvl1pPr>
-          </a:lstStyle>
-          <a:p>
-            <a:pPr>
-              <a:defRPr/>
-            </a:pPr>
-            <a:fld id="{D945C735-E34F-4131-BB72-BEA87C597E5A}" type="datetime1">
-              <a:rPr lang="en-US" smtClean="0"/>
-              <a:t>9/13/2011</a:t>
+          <a:lstStyle/>
+          <a:p>
+            <a:fld id="{254917ED-3EAA-406D-A3BB-AEF6E130108E}" type="datetimeFigureOut">
+              <a:rPr lang="en-US" smtClean="0"/>
+              <a:t>9/26/2011</a:t>
             </a:fld>
             <a:endParaRPr lang="en-US"/>
           </a:p>
@@ -2296,7 +2178,7 @@
       </p:sp>
       <p:sp>
         <p:nvSpPr>
-          <p:cNvPr id="8" name="Footer Placeholder 4"/>
+          <p:cNvPr id="8" name="Footer Placeholder 7"/>
           <p:cNvSpPr>
             <a:spLocks noGrp="1"/>
           </p:cNvSpPr>
@@ -2307,26 +2189,15 @@
         <p:spPr/>
         <p:txBody>
           <a:bodyPr/>
-          <a:lstStyle>
-            <a:lvl1pPr>
-              <a:defRPr/>
-            </a:lvl1pPr>
-          </a:lstStyle>
-          <a:p>
-            <a:pPr>
-              <a:defRPr/>
-            </a:pPr>
-            <a:r>
-              <a:rPr lang="en-US" smtClean="0"/>
-              <a:t>Master footer is here</a:t>
-            </a:r>
-            <a:endParaRPr lang="en-US"/>
-          </a:p>
-        </p:txBody>
-      </p:sp>
-      <p:sp>
-        <p:nvSpPr>
-          <p:cNvPr id="9" name="Slide Number Placeholder 5"/>
+          <a:lstStyle/>
+          <a:p>
+            <a:endParaRPr lang="en-US"/>
+          </a:p>
+        </p:txBody>
+      </p:sp>
+      <p:sp>
+        <p:nvSpPr>
+          <p:cNvPr id="9" name="Slide Number Placeholder 8"/>
           <p:cNvSpPr>
             <a:spLocks noGrp="1"/>
           </p:cNvSpPr>
@@ -2337,20 +2208,10 @@
         <p:spPr/>
         <p:txBody>
           <a:bodyPr/>
-          <a:lstStyle>
-            <a:lvl1pPr>
-              <a:defRPr/>
-            </a:lvl1pPr>
-          </a:lstStyle>
-          <a:p>
-            <a:pPr>
-              <a:defRPr/>
-            </a:pPr>
-            <a:fld id="{3E0BBA0B-1670-4B8D-9BF2-450164EE5542}" type="slidenum">
-              <a:rPr lang="en-US"/>
-              <a:pPr>
-                <a:defRPr/>
-              </a:pPr>
+          <a:lstStyle/>
+          <a:p>
+            <a:fld id="{B6A70819-7E63-4C0C-BF11-645F18DC92FF}" type="slidenum">
+              <a:rPr lang="en-US" smtClean="0"/>
               <a:t>‹#›</a:t>
             </a:fld>
             <a:endParaRPr lang="en-US"/>
@@ -2358,6 +2219,11 @@
         </p:txBody>
       </p:sp>
     </p:spTree>
+    <p:extLst>
+      <p:ext uri="{BB962C8B-B14F-4D97-AF65-F5344CB8AC3E}">
+        <p14:creationId xmlns:p14="http://schemas.microsoft.com/office/powerpoint/2010/main" val="2006712865"/>
+      </p:ext>
+    </p:extLst>
   </p:cSld>
   <p:clrMapOvr>
     <a:masterClrMapping/>
@@ -2407,7 +2273,7 @@
       </p:sp>
       <p:sp>
         <p:nvSpPr>
-          <p:cNvPr id="3" name="Date Placeholder 3"/>
+          <p:cNvPr id="3" name="Date Placeholder 2"/>
           <p:cNvSpPr>
             <a:spLocks noGrp="1"/>
           </p:cNvSpPr>
@@ -2418,18 +2284,11 @@
         <p:spPr/>
         <p:txBody>
           <a:bodyPr/>
-          <a:lstStyle>
-            <a:lvl1pPr>
-              <a:defRPr/>
-            </a:lvl1pPr>
-          </a:lstStyle>
-          <a:p>
-            <a:pPr>
-              <a:defRPr/>
-            </a:pPr>
-            <a:fld id="{A7D09560-FFEF-4EBF-A12A-BE4DCB5C5769}" type="datetime1">
-              <a:rPr lang="en-US" smtClean="0"/>
-              <a:t>9/13/2011</a:t>
+          <a:lstStyle/>
+          <a:p>
+            <a:fld id="{254917ED-3EAA-406D-A3BB-AEF6E130108E}" type="datetimeFigureOut">
+              <a:rPr lang="en-US" smtClean="0"/>
+              <a:t>9/26/2011</a:t>
             </a:fld>
             <a:endParaRPr lang="en-US"/>
           </a:p>
@@ -2437,7 +2296,7 @@
       </p:sp>
       <p:sp>
         <p:nvSpPr>
-          <p:cNvPr id="4" name="Footer Placeholder 4"/>
+          <p:cNvPr id="4" name="Footer Placeholder 3"/>
           <p:cNvSpPr>
             <a:spLocks noGrp="1"/>
           </p:cNvSpPr>
@@ -2448,26 +2307,15 @@
         <p:spPr/>
         <p:txBody>
           <a:bodyPr/>
-          <a:lstStyle>
-            <a:lvl1pPr>
-              <a:defRPr/>
-            </a:lvl1pPr>
-          </a:lstStyle>
-          <a:p>
-            <a:pPr>
-              <a:defRPr/>
-            </a:pPr>
-            <a:r>
-              <a:rPr lang="en-US" smtClean="0"/>
-              <a:t>Master footer is here</a:t>
-            </a:r>
-            <a:endParaRPr lang="en-US"/>
-          </a:p>
-        </p:txBody>
-      </p:sp>
-      <p:sp>
-        <p:nvSpPr>
-          <p:cNvPr id="5" name="Slide Number Placeholder 5"/>
+          <a:lstStyle/>
+          <a:p>
+            <a:endParaRPr lang="en-US"/>
+          </a:p>
+        </p:txBody>
+      </p:sp>
+      <p:sp>
+        <p:nvSpPr>
+          <p:cNvPr id="5" name="Slide Number Placeholder 4"/>
           <p:cNvSpPr>
             <a:spLocks noGrp="1"/>
           </p:cNvSpPr>
@@ -2478,20 +2326,10 @@
         <p:spPr/>
         <p:txBody>
           <a:bodyPr/>
-          <a:lstStyle>
-            <a:lvl1pPr>
-              <a:defRPr/>
-            </a:lvl1pPr>
-          </a:lstStyle>
-          <a:p>
-            <a:pPr>
-              <a:defRPr/>
-            </a:pPr>
-            <a:fld id="{511378EB-7EBB-4D25-8785-9C50CC916B7A}" type="slidenum">
-              <a:rPr lang="en-US"/>
-              <a:pPr>
-                <a:defRPr/>
-              </a:pPr>
+          <a:lstStyle/>
+          <a:p>
+            <a:fld id="{B6A70819-7E63-4C0C-BF11-645F18DC92FF}" type="slidenum">
+              <a:rPr lang="en-US" smtClean="0"/>
               <a:t>‹#›</a:t>
             </a:fld>
             <a:endParaRPr lang="en-US"/>
@@ -2499,6 +2337,11 @@
         </p:txBody>
       </p:sp>
     </p:spTree>
+    <p:extLst>
+      <p:ext uri="{BB962C8B-B14F-4D97-AF65-F5344CB8AC3E}">
+        <p14:creationId xmlns:p14="http://schemas.microsoft.com/office/powerpoint/2010/main" val="4167487949"/>
+      </p:ext>
+    </p:extLst>
   </p:cSld>
   <p:clrMapOvr>
     <a:masterClrMapping/>
@@ -2525,7 +2368,7 @@
       </p:grpSpPr>
       <p:sp>
         <p:nvSpPr>
-          <p:cNvPr id="2" name="Date Placeholder 3"/>
+          <p:cNvPr id="2" name="Date Placeholder 1"/>
           <p:cNvSpPr>
             <a:spLocks noGrp="1"/>
           </p:cNvSpPr>
@@ -2536,18 +2379,11 @@
         <p:spPr/>
         <p:txBody>
           <a:bodyPr/>
-          <a:lstStyle>
-            <a:lvl1pPr>
-              <a:defRPr/>
-            </a:lvl1pPr>
-          </a:lstStyle>
-          <a:p>
-            <a:pPr>
-              <a:defRPr/>
-            </a:pPr>
-            <a:fld id="{DE45B7C7-B876-4119-8C34-C68B59DE498A}" type="datetime1">
-              <a:rPr lang="en-US" smtClean="0"/>
-              <a:t>9/13/2011</a:t>
+          <a:lstStyle/>
+          <a:p>
+            <a:fld id="{254917ED-3EAA-406D-A3BB-AEF6E130108E}" type="datetimeFigureOut">
+              <a:rPr lang="en-US" smtClean="0"/>
+              <a:t>9/26/2011</a:t>
             </a:fld>
             <a:endParaRPr lang="en-US"/>
           </a:p>
@@ -2555,7 +2391,7 @@
       </p:sp>
       <p:sp>
         <p:nvSpPr>
-          <p:cNvPr id="3" name="Footer Placeholder 4"/>
+          <p:cNvPr id="3" name="Footer Placeholder 2"/>
           <p:cNvSpPr>
             <a:spLocks noGrp="1"/>
           </p:cNvSpPr>
@@ -2566,26 +2402,15 @@
         <p:spPr/>
         <p:txBody>
           <a:bodyPr/>
-          <a:lstStyle>
-            <a:lvl1pPr>
-              <a:defRPr/>
-            </a:lvl1pPr>
-          </a:lstStyle>
-          <a:p>
-            <a:pPr>
-              <a:defRPr/>
-            </a:pPr>
-            <a:r>
-              <a:rPr lang="en-US" smtClean="0"/>
-              <a:t>Master footer is here</a:t>
-            </a:r>
-            <a:endParaRPr lang="en-US"/>
-          </a:p>
-        </p:txBody>
-      </p:sp>
-      <p:sp>
-        <p:nvSpPr>
-          <p:cNvPr id="4" name="Slide Number Placeholder 5"/>
+          <a:lstStyle/>
+          <a:p>
+            <a:endParaRPr lang="en-US"/>
+          </a:p>
+        </p:txBody>
+      </p:sp>
+      <p:sp>
+        <p:nvSpPr>
+          <p:cNvPr id="4" name="Slide Number Placeholder 3"/>
           <p:cNvSpPr>
             <a:spLocks noGrp="1"/>
           </p:cNvSpPr>
@@ -2596,20 +2421,10 @@
         <p:spPr/>
         <p:txBody>
           <a:bodyPr/>
-          <a:lstStyle>
-            <a:lvl1pPr>
-              <a:defRPr/>
-            </a:lvl1pPr>
-          </a:lstStyle>
-          <a:p>
-            <a:pPr>
-              <a:defRPr/>
-            </a:pPr>
-            <a:fld id="{3D7B1769-AF22-4513-9A20-D1B7508B5395}" type="slidenum">
-              <a:rPr lang="en-US"/>
-              <a:pPr>
-                <a:defRPr/>
-              </a:pPr>
+          <a:lstStyle/>
+          <a:p>
+            <a:fld id="{B6A70819-7E63-4C0C-BF11-645F18DC92FF}" type="slidenum">
+              <a:rPr lang="en-US" smtClean="0"/>
               <a:t>‹#›</a:t>
             </a:fld>
             <a:endParaRPr lang="en-US"/>
@@ -2617,6 +2432,11 @@
         </p:txBody>
       </p:sp>
     </p:spTree>
+    <p:extLst>
+      <p:ext uri="{BB962C8B-B14F-4D97-AF65-F5344CB8AC3E}">
+        <p14:creationId xmlns:p14="http://schemas.microsoft.com/office/powerpoint/2010/main" val="2196295761"/>
+      </p:ext>
+    </p:extLst>
   </p:cSld>
   <p:clrMapOvr>
     <a:masterClrMapping/>
@@ -2825,7 +2645,7 @@
       </p:sp>
       <p:sp>
         <p:nvSpPr>
-          <p:cNvPr id="5" name="Date Placeholder 3"/>
+          <p:cNvPr id="5" name="Date Placeholder 4"/>
           <p:cNvSpPr>
             <a:spLocks noGrp="1"/>
           </p:cNvSpPr>
@@ -2836,18 +2656,11 @@
         <p:spPr/>
         <p:txBody>
           <a:bodyPr/>
-          <a:lstStyle>
-            <a:lvl1pPr>
-              <a:defRPr/>
-            </a:lvl1pPr>
-          </a:lstStyle>
-          <a:p>
-            <a:pPr>
-              <a:defRPr/>
-            </a:pPr>
-            <a:fld id="{2FB92BCF-E1A2-4F34-9C84-4E75ADCDFD41}" type="datetime1">
-              <a:rPr lang="en-US" smtClean="0"/>
-              <a:t>9/13/2011</a:t>
+          <a:lstStyle/>
+          <a:p>
+            <a:fld id="{254917ED-3EAA-406D-A3BB-AEF6E130108E}" type="datetimeFigureOut">
+              <a:rPr lang="en-US" smtClean="0"/>
+              <a:t>9/26/2011</a:t>
             </a:fld>
             <a:endParaRPr lang="en-US"/>
           </a:p>
@@ -2855,7 +2668,7 @@
       </p:sp>
       <p:sp>
         <p:nvSpPr>
-          <p:cNvPr id="6" name="Footer Placeholder 4"/>
+          <p:cNvPr id="6" name="Footer Placeholder 5"/>
           <p:cNvSpPr>
             <a:spLocks noGrp="1"/>
           </p:cNvSpPr>
@@ -2866,26 +2679,15 @@
         <p:spPr/>
         <p:txBody>
           <a:bodyPr/>
-          <a:lstStyle>
-            <a:lvl1pPr>
-              <a:defRPr/>
-            </a:lvl1pPr>
-          </a:lstStyle>
-          <a:p>
-            <a:pPr>
-              <a:defRPr/>
-            </a:pPr>
-            <a:r>
-              <a:rPr lang="en-US" smtClean="0"/>
-              <a:t>Master footer is here</a:t>
-            </a:r>
-            <a:endParaRPr lang="en-US"/>
-          </a:p>
-        </p:txBody>
-      </p:sp>
-      <p:sp>
-        <p:nvSpPr>
-          <p:cNvPr id="7" name="Slide Number Placeholder 5"/>
+          <a:lstStyle/>
+          <a:p>
+            <a:endParaRPr lang="en-US"/>
+          </a:p>
+        </p:txBody>
+      </p:sp>
+      <p:sp>
+        <p:nvSpPr>
+          <p:cNvPr id="7" name="Slide Number Placeholder 6"/>
           <p:cNvSpPr>
             <a:spLocks noGrp="1"/>
           </p:cNvSpPr>
@@ -2896,20 +2698,10 @@
         <p:spPr/>
         <p:txBody>
           <a:bodyPr/>
-          <a:lstStyle>
-            <a:lvl1pPr>
-              <a:defRPr/>
-            </a:lvl1pPr>
-          </a:lstStyle>
-          <a:p>
-            <a:pPr>
-              <a:defRPr/>
-            </a:pPr>
-            <a:fld id="{C8CAF952-0781-4311-9A39-60BF373BDD42}" type="slidenum">
-              <a:rPr lang="en-US"/>
-              <a:pPr>
-                <a:defRPr/>
-              </a:pPr>
+          <a:lstStyle/>
+          <a:p>
+            <a:fld id="{B6A70819-7E63-4C0C-BF11-645F18DC92FF}" type="slidenum">
+              <a:rPr lang="en-US" smtClean="0"/>
               <a:t>‹#›</a:t>
             </a:fld>
             <a:endParaRPr lang="en-US"/>
@@ -2917,6 +2709,11 @@
         </p:txBody>
       </p:sp>
     </p:spTree>
+    <p:extLst>
+      <p:ext uri="{BB962C8B-B14F-4D97-AF65-F5344CB8AC3E}">
+        <p14:creationId xmlns:p14="http://schemas.microsoft.com/office/powerpoint/2010/main" val="2128132541"/>
+      </p:ext>
+    </p:extLst>
   </p:cSld>
   <p:clrMapOvr>
     <a:masterClrMapping/>
@@ -2990,9 +2787,7 @@
           </a:xfrm>
         </p:spPr>
         <p:txBody>
-          <a:bodyPr rtlCol="0">
-            <a:normAutofit/>
-          </a:bodyPr>
+          <a:bodyPr/>
           <a:lstStyle>
             <a:lvl1pPr marL="0" indent="0">
               <a:buNone/>
@@ -3032,8 +2827,7 @@
             </a:lvl9pPr>
           </a:lstStyle>
           <a:p>
-            <a:pPr lvl="0"/>
-            <a:endParaRPr lang="en-US" noProof="0" smtClean="0"/>
+            <a:endParaRPr lang="en-US"/>
           </a:p>
         </p:txBody>
       </p:sp>
@@ -3104,7 +2898,7 @@
       </p:sp>
       <p:sp>
         <p:nvSpPr>
-          <p:cNvPr id="5" name="Date Placeholder 3"/>
+          <p:cNvPr id="5" name="Date Placeholder 4"/>
           <p:cNvSpPr>
             <a:spLocks noGrp="1"/>
           </p:cNvSpPr>
@@ -3115,18 +2909,11 @@
         <p:spPr/>
         <p:txBody>
           <a:bodyPr/>
-          <a:lstStyle>
-            <a:lvl1pPr>
-              <a:defRPr/>
-            </a:lvl1pPr>
-          </a:lstStyle>
-          <a:p>
-            <a:pPr>
-              <a:defRPr/>
-            </a:pPr>
-            <a:fld id="{263800B0-C882-48EA-91AB-5EC8DC93ED22}" type="datetime1">
-              <a:rPr lang="en-US" smtClean="0"/>
-              <a:t>9/13/2011</a:t>
+          <a:lstStyle/>
+          <a:p>
+            <a:fld id="{254917ED-3EAA-406D-A3BB-AEF6E130108E}" type="datetimeFigureOut">
+              <a:rPr lang="en-US" smtClean="0"/>
+              <a:t>9/26/2011</a:t>
             </a:fld>
             <a:endParaRPr lang="en-US"/>
           </a:p>
@@ -3134,7 +2921,7 @@
       </p:sp>
       <p:sp>
         <p:nvSpPr>
-          <p:cNvPr id="6" name="Footer Placeholder 4"/>
+          <p:cNvPr id="6" name="Footer Placeholder 5"/>
           <p:cNvSpPr>
             <a:spLocks noGrp="1"/>
           </p:cNvSpPr>
@@ -3145,26 +2932,15 @@
         <p:spPr/>
         <p:txBody>
           <a:bodyPr/>
-          <a:lstStyle>
-            <a:lvl1pPr>
-              <a:defRPr/>
-            </a:lvl1pPr>
-          </a:lstStyle>
-          <a:p>
-            <a:pPr>
-              <a:defRPr/>
-            </a:pPr>
-            <a:r>
-              <a:rPr lang="en-US" smtClean="0"/>
-              <a:t>Master footer is here</a:t>
-            </a:r>
-            <a:endParaRPr lang="en-US"/>
-          </a:p>
-        </p:txBody>
-      </p:sp>
-      <p:sp>
-        <p:nvSpPr>
-          <p:cNvPr id="7" name="Slide Number Placeholder 5"/>
+          <a:lstStyle/>
+          <a:p>
+            <a:endParaRPr lang="en-US"/>
+          </a:p>
+        </p:txBody>
+      </p:sp>
+      <p:sp>
+        <p:nvSpPr>
+          <p:cNvPr id="7" name="Slide Number Placeholder 6"/>
           <p:cNvSpPr>
             <a:spLocks noGrp="1"/>
           </p:cNvSpPr>
@@ -3175,20 +2951,10 @@
         <p:spPr/>
         <p:txBody>
           <a:bodyPr/>
-          <a:lstStyle>
-            <a:lvl1pPr>
-              <a:defRPr/>
-            </a:lvl1pPr>
-          </a:lstStyle>
-          <a:p>
-            <a:pPr>
-              <a:defRPr/>
-            </a:pPr>
-            <a:fld id="{DC850A72-81F1-4716-807C-68708F80AB39}" type="slidenum">
-              <a:rPr lang="en-US"/>
-              <a:pPr>
-                <a:defRPr/>
-              </a:pPr>
+          <a:lstStyle/>
+          <a:p>
+            <a:fld id="{B6A70819-7E63-4C0C-BF11-645F18DC92FF}" type="slidenum">
+              <a:rPr lang="en-US" smtClean="0"/>
               <a:t>‹#›</a:t>
             </a:fld>
             <a:endParaRPr lang="en-US"/>
@@ -3196,6 +2962,11 @@
         </p:txBody>
       </p:sp>
     </p:spTree>
+    <p:extLst>
+      <p:ext uri="{BB962C8B-B14F-4D97-AF65-F5344CB8AC3E}">
+        <p14:creationId xmlns:p14="http://schemas.microsoft.com/office/powerpoint/2010/main" val="3763820124"/>
+      </p:ext>
+    </p:extLst>
   </p:cSld>
   <p:clrMapOvr>
     <a:masterClrMapping/>
@@ -3227,7 +2998,7 @@
       </p:grpSpPr>
       <p:sp>
         <p:nvSpPr>
-          <p:cNvPr id="1026" name="Title Placeholder 1"/>
+          <p:cNvPr id="2" name="Title Placeholder 1"/>
           <p:cNvSpPr>
             <a:spLocks noGrp="1"/>
           </p:cNvSpPr>
@@ -3235,7 +3006,7 @@
             <p:ph type="title"/>
           </p:nvPr>
         </p:nvSpPr>
-        <p:spPr bwMode="auto">
+        <p:spPr>
           <a:xfrm>
             <a:off x="457200" y="274638"/>
             <a:ext cx="8229600" cy="1143000"/>
@@ -3243,33 +3014,24 @@
           <a:prstGeom prst="rect">
             <a:avLst/>
           </a:prstGeom>
-          <a:noFill/>
-          <a:ln w="9525">
-            <a:noFill/>
-            <a:miter lim="800000"/>
-            <a:headEnd/>
-            <a:tailEnd/>
-          </a:ln>
         </p:spPr>
         <p:txBody>
-          <a:bodyPr vert="horz" wrap="square" lIns="91440" tIns="45720" rIns="91440" bIns="45720" numCol="1" anchor="ctr" anchorCtr="0" compatLnSpc="1">
-            <a:prstTxWarp prst="textNoShape">
-              <a:avLst/>
-            </a:prstTxWarp>
+          <a:bodyPr vert="horz" lIns="91440" tIns="45720" rIns="91440" bIns="45720" rtlCol="0" anchor="ctr">
+            <a:normAutofit/>
           </a:bodyPr>
           <a:lstStyle/>
           <a:p>
-            <a:pPr lvl="0"/>
-            <a:r>
-              <a:rPr lang="en-US" smtClean="0"/>
-              <a:t>Click to edit Master title style</a:t>
-            </a:r>
-          </a:p>
-        </p:txBody>
-      </p:sp>
-      <p:sp>
-        <p:nvSpPr>
-          <p:cNvPr id="1027" name="Text Placeholder 2"/>
+            <a:r>
+              <a:rPr lang="en-US" dirty="0" smtClean="0"/>
+              <a:t>Theme Master Title</a:t>
+            </a:r>
+            <a:endParaRPr lang="en-US" dirty="0"/>
+          </a:p>
+        </p:txBody>
+      </p:sp>
+      <p:sp>
+        <p:nvSpPr>
+          <p:cNvPr id="3" name="Text Placeholder 2"/>
           <p:cNvSpPr>
             <a:spLocks noGrp="1"/>
           </p:cNvSpPr>
@@ -3277,7 +3039,7 @@
             <p:ph type="body" idx="1"/>
           </p:nvPr>
         </p:nvSpPr>
-        <p:spPr bwMode="auto">
+        <p:spPr>
           <a:xfrm>
             <a:off x="457200" y="1600200"/>
             <a:ext cx="8229600" cy="4525963"/>
@@ -3285,55 +3047,48 @@
           <a:prstGeom prst="rect">
             <a:avLst/>
           </a:prstGeom>
-          <a:noFill/>
-          <a:ln w="9525">
-            <a:noFill/>
-            <a:miter lim="800000"/>
-            <a:headEnd/>
-            <a:tailEnd/>
-          </a:ln>
         </p:spPr>
         <p:txBody>
-          <a:bodyPr vert="horz" wrap="square" lIns="91440" tIns="45720" rIns="91440" bIns="45720" numCol="1" anchor="t" anchorCtr="0" compatLnSpc="1">
-            <a:prstTxWarp prst="textNoShape">
-              <a:avLst/>
-            </a:prstTxWarp>
+          <a:bodyPr vert="horz" lIns="91440" tIns="45720" rIns="91440" bIns="45720" rtlCol="0">
+            <a:normAutofit/>
           </a:bodyPr>
           <a:lstStyle/>
           <a:p>
             <a:pPr lvl="0"/>
             <a:r>
-              <a:rPr lang="en-US" smtClean="0"/>
-              <a:t>Click to edit Master text styles</a:t>
+              <a:rPr lang="en-US" dirty="0" smtClean="0"/>
+              <a:t>Theme Master first level</a:t>
             </a:r>
           </a:p>
           <a:p>
             <a:pPr lvl="1"/>
             <a:r>
-              <a:rPr lang="en-US" smtClean="0"/>
-              <a:t>Second level</a:t>
+              <a:rPr lang="en-US" dirty="0" smtClean="0"/>
+              <a:t>And the 2nd level</a:t>
             </a:r>
           </a:p>
           <a:p>
             <a:pPr lvl="2"/>
             <a:r>
-              <a:rPr lang="en-US" smtClean="0"/>
-              <a:t>Third level</a:t>
-            </a:r>
+              <a:rPr lang="en-GB" dirty="0" smtClean="0"/>
+              <a:t>Our 3rd level goes here</a:t>
+            </a:r>
+            <a:endParaRPr lang="en-US" dirty="0" smtClean="0"/>
           </a:p>
           <a:p>
             <a:pPr lvl="3"/>
             <a:r>
-              <a:rPr lang="en-US" smtClean="0"/>
-              <a:t>Fourth level</a:t>
+              <a:rPr lang="en-US" dirty="0" smtClean="0"/>
+              <a:t>And onto the 4th, such fun….</a:t>
             </a:r>
           </a:p>
           <a:p>
             <a:pPr lvl="4"/>
             <a:r>
-              <a:rPr lang="en-US" smtClean="0"/>
-              <a:t>Fifth level</a:t>
-            </a:r>
+              <a:rPr lang="en-US" dirty="0" smtClean="0"/>
+              <a:t>Finally is the Fifth level</a:t>
+            </a:r>
+            <a:endParaRPr lang="en-US" dirty="0"/>
           </a:p>
         </p:txBody>
       </p:sp>
@@ -3359,30 +3114,20 @@
         <p:txBody>
           <a:bodyPr vert="horz" lIns="91440" tIns="45720" rIns="91440" bIns="45720" rtlCol="0" anchor="ctr"/>
           <a:lstStyle>
-            <a:lvl1pPr algn="l" fontAlgn="auto">
-              <a:spcBef>
-                <a:spcPts val="0"/>
-              </a:spcBef>
-              <a:spcAft>
-                <a:spcPts val="0"/>
-              </a:spcAft>
-              <a:defRPr sz="1200" smtClean="0">
+            <a:lvl1pPr algn="l">
+              <a:defRPr sz="1200">
                 <a:solidFill>
                   <a:schemeClr val="tx1">
                     <a:tint val="75000"/>
                   </a:schemeClr>
                 </a:solidFill>
-                <a:latin typeface="+mn-lt"/>
               </a:defRPr>
             </a:lvl1pPr>
           </a:lstStyle>
           <a:p>
-            <a:pPr>
-              <a:defRPr/>
-            </a:pPr>
-            <a:fld id="{96407155-1F88-428A-9438-8494AB1DC880}" type="datetime1">
-              <a:rPr lang="en-US" smtClean="0"/>
-              <a:t>9/13/2011</a:t>
+            <a:fld id="{254917ED-3EAA-406D-A3BB-AEF6E130108E}" type="datetimeFigureOut">
+              <a:rPr lang="en-US" smtClean="0"/>
+              <a:t>9/26/2011</a:t>
             </a:fld>
             <a:endParaRPr lang="en-US"/>
           </a:p>
@@ -3410,31 +3155,17 @@
         <p:txBody>
           <a:bodyPr vert="horz" lIns="91440" tIns="45720" rIns="91440" bIns="45720" rtlCol="0" anchor="ctr"/>
           <a:lstStyle>
-            <a:lvl1pPr algn="ctr" fontAlgn="auto">
-              <a:spcBef>
-                <a:spcPts val="0"/>
-              </a:spcBef>
-              <a:spcAft>
-                <a:spcPts val="0"/>
-              </a:spcAft>
-              <a:defRPr sz="1200" smtClean="0">
+            <a:lvl1pPr algn="ctr">
+              <a:defRPr sz="1200">
                 <a:solidFill>
                   <a:schemeClr val="tx1">
                     <a:tint val="75000"/>
                   </a:schemeClr>
                 </a:solidFill>
-                <a:latin typeface="+mn-lt"/>
               </a:defRPr>
             </a:lvl1pPr>
           </a:lstStyle>
           <a:p>
-            <a:pPr>
-              <a:defRPr/>
-            </a:pPr>
-            <a:r>
-              <a:rPr lang="en-US" smtClean="0"/>
-              <a:t>Master footer is here</a:t>
-            </a:r>
             <a:endParaRPr lang="en-US"/>
           </a:p>
         </p:txBody>
@@ -3461,32 +3192,19 @@
         <p:txBody>
           <a:bodyPr vert="horz" lIns="91440" tIns="45720" rIns="91440" bIns="45720" rtlCol="0" anchor="ctr"/>
           <a:lstStyle>
-            <a:lvl1pPr algn="r" fontAlgn="auto">
-              <a:spcBef>
-                <a:spcPts val="0"/>
-              </a:spcBef>
-              <a:spcAft>
-                <a:spcPts val="0"/>
-              </a:spcAft>
-              <a:defRPr sz="1200" smtClean="0">
+            <a:lvl1pPr algn="r">
+              <a:defRPr sz="1200">
                 <a:solidFill>
                   <a:schemeClr val="tx1">
                     <a:tint val="75000"/>
                   </a:schemeClr>
                 </a:solidFill>
-                <a:latin typeface="+mn-lt"/>
               </a:defRPr>
             </a:lvl1pPr>
           </a:lstStyle>
           <a:p>
-            <a:pPr>
-              <a:defRPr/>
-            </a:pPr>
-            <a:fld id="{1981F394-D5BF-416A-987A-AB0073D82A68}" type="slidenum">
-              <a:rPr lang="en-US"/>
-              <a:pPr>
-                <a:defRPr/>
-              </a:pPr>
+            <a:fld id="{B6A70819-7E63-4C0C-BF11-645F18DC92FF}" type="slidenum">
+              <a:rPr lang="en-US" smtClean="0"/>
               <a:t>‹#›</a:t>
             </a:fld>
             <a:endParaRPr lang="en-US"/>
@@ -3494,31 +3212,33 @@
         </p:txBody>
       </p:sp>
     </p:spTree>
+    <p:extLst>
+      <p:ext uri="{BB962C8B-B14F-4D97-AF65-F5344CB8AC3E}">
+        <p14:creationId xmlns:p14="http://schemas.microsoft.com/office/powerpoint/2010/main" val="127694049"/>
+      </p:ext>
+    </p:extLst>
   </p:cSld>
   <p:clrMap bg1="lt1" tx1="dk1" bg2="lt2" tx2="dk2" accent1="accent1" accent2="accent2" accent3="accent3" accent4="accent4" accent5="accent5" accent6="accent6" hlink="hlink" folHlink="folHlink"/>
   <p:sldLayoutIdLst>
-    <p:sldLayoutId id="2147483671" r:id="rId1"/>
-    <p:sldLayoutId id="2147483661" r:id="rId2"/>
-    <p:sldLayoutId id="2147483662" r:id="rId3"/>
-    <p:sldLayoutId id="2147483663" r:id="rId4"/>
-    <p:sldLayoutId id="2147483664" r:id="rId5"/>
-    <p:sldLayoutId id="2147483665" r:id="rId6"/>
-    <p:sldLayoutId id="2147483666" r:id="rId7"/>
-    <p:sldLayoutId id="2147483667" r:id="rId8"/>
-    <p:sldLayoutId id="2147483668" r:id="rId9"/>
-    <p:sldLayoutId id="2147483669" r:id="rId10"/>
-    <p:sldLayoutId id="2147483670" r:id="rId11"/>
+    <p:sldLayoutId id="2147483649" r:id="rId1"/>
+    <p:sldLayoutId id="2147483650" r:id="rId2"/>
+    <p:sldLayoutId id="2147483651" r:id="rId3"/>
+    <p:sldLayoutId id="2147483652" r:id="rId4"/>
+    <p:sldLayoutId id="2147483653" r:id="rId5"/>
+    <p:sldLayoutId id="2147483654" r:id="rId6"/>
+    <p:sldLayoutId id="2147483655" r:id="rId7"/>
+    <p:sldLayoutId id="2147483656" r:id="rId8"/>
+    <p:sldLayoutId id="2147483657" r:id="rId9"/>
+    <p:sldLayoutId id="2147483658" r:id="rId10"/>
+    <p:sldLayoutId id="2147483659" r:id="rId11"/>
   </p:sldLayoutIdLst>
-  <p:hf sldNum="0" hdr="0" dt="0"/>
   <p:txStyles>
     <p:titleStyle>
-      <a:lvl1pPr algn="ctr" rtl="0" fontAlgn="base">
+      <a:lvl1pPr algn="ctr" defTabSz="914400" rtl="0" eaLnBrk="1" latinLnBrk="0" hangingPunct="1">
         <a:spcBef>
           <a:spcPct val="0"/>
         </a:spcBef>
-        <a:spcAft>
-          <a:spcPct val="0"/>
-        </a:spcAft>
+        <a:buNone/>
         <a:defRPr sz="4400" kern="1200">
           <a:solidFill>
             <a:schemeClr val="tx1"/>
@@ -3528,128 +3248,13 @@
           <a:cs typeface="+mj-cs"/>
         </a:defRPr>
       </a:lvl1pPr>
-      <a:lvl2pPr algn="ctr" rtl="0" fontAlgn="base">
-        <a:spcBef>
-          <a:spcPct val="0"/>
-        </a:spcBef>
-        <a:spcAft>
-          <a:spcPct val="0"/>
-        </a:spcAft>
-        <a:defRPr sz="4400">
-          <a:solidFill>
-            <a:schemeClr val="tx1"/>
-          </a:solidFill>
-          <a:latin typeface="Calibri" pitchFamily="34" charset="0"/>
-        </a:defRPr>
-      </a:lvl2pPr>
-      <a:lvl3pPr algn="ctr" rtl="0" fontAlgn="base">
-        <a:spcBef>
-          <a:spcPct val="0"/>
-        </a:spcBef>
-        <a:spcAft>
-          <a:spcPct val="0"/>
-        </a:spcAft>
-        <a:defRPr sz="4400">
-          <a:solidFill>
-            <a:schemeClr val="tx1"/>
-          </a:solidFill>
-          <a:latin typeface="Calibri" pitchFamily="34" charset="0"/>
-        </a:defRPr>
-      </a:lvl3pPr>
-      <a:lvl4pPr algn="ctr" rtl="0" fontAlgn="base">
-        <a:spcBef>
-          <a:spcPct val="0"/>
-        </a:spcBef>
-        <a:spcAft>
-          <a:spcPct val="0"/>
-        </a:spcAft>
-        <a:defRPr sz="4400">
-          <a:solidFill>
-            <a:schemeClr val="tx1"/>
-          </a:solidFill>
-          <a:latin typeface="Calibri" pitchFamily="34" charset="0"/>
-        </a:defRPr>
-      </a:lvl4pPr>
-      <a:lvl5pPr algn="ctr" rtl="0" fontAlgn="base">
-        <a:spcBef>
-          <a:spcPct val="0"/>
-        </a:spcBef>
-        <a:spcAft>
-          <a:spcPct val="0"/>
-        </a:spcAft>
-        <a:defRPr sz="4400">
-          <a:solidFill>
-            <a:schemeClr val="tx1"/>
-          </a:solidFill>
-          <a:latin typeface="Calibri" pitchFamily="34" charset="0"/>
-        </a:defRPr>
-      </a:lvl5pPr>
-      <a:lvl6pPr marL="457200" algn="ctr" rtl="0" fontAlgn="base">
-        <a:spcBef>
-          <a:spcPct val="0"/>
-        </a:spcBef>
-        <a:spcAft>
-          <a:spcPct val="0"/>
-        </a:spcAft>
-        <a:defRPr sz="4400">
-          <a:solidFill>
-            <a:schemeClr val="tx1"/>
-          </a:solidFill>
-          <a:latin typeface="Calibri" pitchFamily="34" charset="0"/>
-        </a:defRPr>
-      </a:lvl6pPr>
-      <a:lvl7pPr marL="914400" algn="ctr" rtl="0" fontAlgn="base">
-        <a:spcBef>
-          <a:spcPct val="0"/>
-        </a:spcBef>
-        <a:spcAft>
-          <a:spcPct val="0"/>
-        </a:spcAft>
-        <a:defRPr sz="4400">
-          <a:solidFill>
-            <a:schemeClr val="tx1"/>
-          </a:solidFill>
-          <a:latin typeface="Calibri" pitchFamily="34" charset="0"/>
-        </a:defRPr>
-      </a:lvl7pPr>
-      <a:lvl8pPr marL="1371600" algn="ctr" rtl="0" fontAlgn="base">
-        <a:spcBef>
-          <a:spcPct val="0"/>
-        </a:spcBef>
-        <a:spcAft>
-          <a:spcPct val="0"/>
-        </a:spcAft>
-        <a:defRPr sz="4400">
-          <a:solidFill>
-            <a:schemeClr val="tx1"/>
-          </a:solidFill>
-          <a:latin typeface="Calibri" pitchFamily="34" charset="0"/>
-        </a:defRPr>
-      </a:lvl8pPr>
-      <a:lvl9pPr marL="1828800" algn="ctr" rtl="0" fontAlgn="base">
-        <a:spcBef>
-          <a:spcPct val="0"/>
-        </a:spcBef>
-        <a:spcAft>
-          <a:spcPct val="0"/>
-        </a:spcAft>
-        <a:defRPr sz="4400">
-          <a:solidFill>
-            <a:schemeClr val="tx1"/>
-          </a:solidFill>
-          <a:latin typeface="Calibri" pitchFamily="34" charset="0"/>
-        </a:defRPr>
-      </a:lvl9pPr>
     </p:titleStyle>
     <p:bodyStyle>
-      <a:lvl1pPr marL="342900" indent="-342900" algn="l" rtl="0" fontAlgn="base">
+      <a:lvl1pPr marL="342900" indent="-342900" algn="l" defTabSz="914400" rtl="0" eaLnBrk="1" latinLnBrk="0" hangingPunct="1">
         <a:spcBef>
           <a:spcPct val="20000"/>
         </a:spcBef>
-        <a:spcAft>
-          <a:spcPct val="0"/>
-        </a:spcAft>
-        <a:buFont typeface="Arial" charset="0"/>
+        <a:buFont typeface="Arial" pitchFamily="34" charset="0"/>
         <a:buChar char="•"/>
         <a:defRPr sz="3200" kern="1200">
           <a:solidFill>
@@ -3660,16 +3265,13 @@
           <a:cs typeface="+mn-cs"/>
         </a:defRPr>
       </a:lvl1pPr>
-      <a:lvl2pPr marL="742950" indent="-285750" algn="l" rtl="0" fontAlgn="base">
+      <a:lvl2pPr marL="742950" indent="-285750" algn="l" defTabSz="914400" rtl="0" eaLnBrk="1" latinLnBrk="0" hangingPunct="1">
         <a:spcBef>
           <a:spcPct val="20000"/>
         </a:spcBef>
-        <a:spcAft>
-          <a:spcPct val="0"/>
-        </a:spcAft>
-        <a:buFont typeface="Arial" charset="0"/>
+        <a:buFont typeface="Arial" pitchFamily="34" charset="0"/>
         <a:buChar char="–"/>
-        <a:defRPr sz="2800" kern="1200">
+        <a:defRPr sz="2800" b="1" kern="1200" baseline="30000">
           <a:solidFill>
             <a:schemeClr val="tx1"/>
           </a:solidFill>
@@ -3678,16 +3280,13 @@
           <a:cs typeface="+mn-cs"/>
         </a:defRPr>
       </a:lvl2pPr>
-      <a:lvl3pPr marL="1143000" indent="-228600" algn="l" rtl="0" fontAlgn="base">
+      <a:lvl3pPr marL="1143000" indent="-228600" algn="l" defTabSz="914400" rtl="0" eaLnBrk="1" latinLnBrk="0" hangingPunct="1">
         <a:spcBef>
           <a:spcPct val="20000"/>
         </a:spcBef>
-        <a:spcAft>
-          <a:spcPct val="0"/>
-        </a:spcAft>
-        <a:buFont typeface="Arial" charset="0"/>
+        <a:buFont typeface="Arial" pitchFamily="34" charset="0"/>
         <a:buChar char="•"/>
-        <a:defRPr sz="2400" kern="1200">
+        <a:defRPr sz="2400" i="1" kern="1200" baseline="0">
           <a:solidFill>
             <a:schemeClr val="tx1"/>
           </a:solidFill>
@@ -3696,16 +3295,13 @@
           <a:cs typeface="+mn-cs"/>
         </a:defRPr>
       </a:lvl3pPr>
-      <a:lvl4pPr marL="1600200" indent="-228600" algn="l" rtl="0" fontAlgn="base">
+      <a:lvl4pPr marL="1600200" indent="-228600" algn="l" defTabSz="914400" rtl="0" eaLnBrk="1" latinLnBrk="0" hangingPunct="1">
         <a:spcBef>
           <a:spcPct val="20000"/>
         </a:spcBef>
-        <a:spcAft>
-          <a:spcPct val="0"/>
-        </a:spcAft>
-        <a:buFont typeface="Arial" charset="0"/>
+        <a:buFont typeface="Arial" pitchFamily="34" charset="0"/>
         <a:buChar char="–"/>
-        <a:defRPr sz="2000" kern="1200">
+        <a:defRPr sz="2000" kern="1200" baseline="0">
           <a:solidFill>
             <a:schemeClr val="tx1"/>
           </a:solidFill>
@@ -3714,14 +3310,11 @@
           <a:cs typeface="+mn-cs"/>
         </a:defRPr>
       </a:lvl4pPr>
-      <a:lvl5pPr marL="2057400" indent="-228600" algn="l" rtl="0" fontAlgn="base">
+      <a:lvl5pPr marL="2057400" indent="-228600" algn="l" defTabSz="914400" rtl="0" eaLnBrk="1" latinLnBrk="0" hangingPunct="1">
         <a:spcBef>
           <a:spcPct val="20000"/>
         </a:spcBef>
-        <a:spcAft>
-          <a:spcPct val="0"/>
-        </a:spcAft>
-        <a:buFont typeface="Arial" charset="0"/>
+        <a:buFont typeface="Arial" pitchFamily="34" charset="0"/>
         <a:buChar char="»"/>
         <a:defRPr sz="2000" kern="1200">
           <a:solidFill>
@@ -3911,7 +3504,7 @@
       </p:grpSpPr>
       <p:sp>
         <p:nvSpPr>
-          <p:cNvPr id="3074" name="Title 1"/>
+          <p:cNvPr id="2" name="Title 1"/>
           <p:cNvSpPr>
             <a:spLocks noGrp="1"/>
           </p:cNvSpPr>
@@ -3924,7 +3517,11 @@
           <a:bodyPr/>
           <a:lstStyle/>
           <a:p>
-            <a:endParaRPr lang="en-US" smtClean="0"/>
+            <a:r>
+              <a:rPr lang="en-GB" dirty="0" smtClean="0"/>
+              <a:t>First page title</a:t>
+            </a:r>
+            <a:endParaRPr lang="en-US" dirty="0"/>
           </a:p>
         </p:txBody>
       </p:sp>
@@ -3940,26 +3537,100 @@
         </p:nvSpPr>
         <p:spPr/>
         <p:txBody>
-          <a:bodyPr rtlCol="0">
-            <a:normAutofit/>
-          </a:bodyPr>
-          <a:lstStyle/>
-          <a:p>
-            <a:pPr fontAlgn="auto">
-              <a:spcAft>
-                <a:spcPts val="0"/>
-              </a:spcAft>
-              <a:buFont typeface="Arial" pitchFamily="34" charset="0"/>
-              <a:buNone/>
-              <a:defRPr/>
-            </a:pPr>
-            <a:endParaRPr lang="en-US" dirty="0" smtClean="0"/>
-          </a:p>
-        </p:txBody>
-      </p:sp>
-      <p:sp>
-        <p:nvSpPr>
-          <p:cNvPr id="4" name="Footer Placeholder 3"/>
+          <a:bodyPr/>
+          <a:lstStyle/>
+          <a:p>
+            <a:r>
+              <a:rPr lang="en-GB" dirty="0" smtClean="0"/>
+              <a:t>First page subtitle</a:t>
+            </a:r>
+            <a:endParaRPr lang="en-US" dirty="0"/>
+          </a:p>
+        </p:txBody>
+      </p:sp>
+    </p:spTree>
+    <p:extLst>
+      <p:ext uri="{BB962C8B-B14F-4D97-AF65-F5344CB8AC3E}">
+        <p14:creationId xmlns:p14="http://schemas.microsoft.com/office/powerpoint/2010/main" val="3469315054"/>
+      </p:ext>
+    </p:extLst>
+  </p:cSld>
+  <p:clrMapOvr>
+    <a:masterClrMapping/>
+  </p:clrMapOvr>
+</p:sld>
+</file>
+
+<file path=ppt/slides/slide2.xml><?xml version="1.0" encoding="utf-8"?>
+<p:sld xmlns:a="http://schemas.openxmlformats.org/drawingml/2006/main" xmlns:r="http://schemas.openxmlformats.org/officeDocument/2006/relationships" xmlns:p="http://schemas.openxmlformats.org/presentationml/2006/main">
+  <p:cSld>
+    <p:spTree>
+      <p:nvGrpSpPr>
+        <p:cNvPr id="1" name=""/>
+        <p:cNvGrpSpPr/>
+        <p:nvPr/>
+      </p:nvGrpSpPr>
+      <p:grpSpPr>
+        <a:xfrm>
+          <a:off x="0" y="0"/>
+          <a:ext cx="0" cy="0"/>
+          <a:chOff x="0" y="0"/>
+          <a:chExt cx="0" cy="0"/>
+        </a:xfrm>
+      </p:grpSpPr>
+      <p:sp>
+        <p:nvSpPr>
+          <p:cNvPr id="4" name="Title 3"/>
+          <p:cNvSpPr>
+            <a:spLocks noGrp="1"/>
+          </p:cNvSpPr>
+          <p:nvPr>
+            <p:ph type="ctrTitle"/>
+          </p:nvPr>
+        </p:nvSpPr>
+        <p:spPr/>
+        <p:txBody>
+          <a:bodyPr/>
+          <a:lstStyle/>
+          <a:p>
+            <a:endParaRPr lang="en-US"/>
+          </a:p>
+        </p:txBody>
+      </p:sp>
+      <p:sp>
+        <p:nvSpPr>
+          <p:cNvPr id="5" name="Subtitle 4"/>
+          <p:cNvSpPr>
+            <a:spLocks noGrp="1"/>
+          </p:cNvSpPr>
+          <p:nvPr>
+            <p:ph type="subTitle" idx="1"/>
+          </p:nvPr>
+        </p:nvSpPr>
+        <p:spPr/>
+        <p:txBody>
+          <a:bodyPr/>
+          <a:lstStyle/>
+          <a:p>
+            <a:r>
+              <a:rPr lang="en-GB" dirty="0" smtClean="0"/>
+              <a:t>2</a:t>
+            </a:r>
+            <a:r>
+              <a:rPr lang="en-GB" baseline="30000" dirty="0" smtClean="0"/>
+              <a:t>nd</a:t>
+            </a:r>
+            <a:r>
+              <a:rPr lang="en-GB" dirty="0" smtClean="0"/>
+              <a:t> page subtitle</a:t>
+            </a:r>
+            <a:endParaRPr lang="en-US" dirty="0"/>
+          </a:p>
+        </p:txBody>
+      </p:sp>
+      <p:sp>
+        <p:nvSpPr>
+          <p:cNvPr id="6" name="Footer Placeholder 5"/>
           <p:cNvSpPr>
             <a:spLocks noGrp="1"/>
           </p:cNvSpPr>
@@ -3972,18 +3643,20 @@
           <a:bodyPr/>
           <a:lstStyle/>
           <a:p>
-            <a:pPr>
-              <a:defRPr/>
-            </a:pPr>
-            <a:r>
-              <a:rPr lang="en-US" smtClean="0"/>
-              <a:t>Master footer is here</a:t>
-            </a:r>
-            <a:endParaRPr lang="en-US"/>
+            <a:r>
+              <a:rPr lang="en-GB" smtClean="0"/>
+              <a:t>Footer from the master slide</a:t>
+            </a:r>
+            <a:endParaRPr lang="en-US" dirty="0"/>
           </a:p>
         </p:txBody>
       </p:sp>
     </p:spTree>
+    <p:extLst>
+      <p:ext uri="{BB962C8B-B14F-4D97-AF65-F5344CB8AC3E}">
+        <p14:creationId xmlns:p14="http://schemas.microsoft.com/office/powerpoint/2010/main" val="2046150092"/>
+      </p:ext>
+    </p:extLst>
   </p:cSld>
   <p:clrMapOvr>
     <a:masterClrMapping/>
@@ -4066,6 +3739,7 @@
         <a:font script="Mong" typeface="Mongolian Baiti"/>
         <a:font script="Viet" typeface="Times New Roman"/>
         <a:font script="Uigh" typeface="Microsoft Uighur"/>
+        <a:font script="Geor" typeface="Sylfaen"/>
       </a:majorFont>
       <a:minorFont>
         <a:latin typeface="Calibri"/>
@@ -4100,6 +3774,7 @@
         <a:font script="Mong" typeface="Mongolian Baiti"/>
         <a:font script="Viet" typeface="Arial"/>
         <a:font script="Uigh" typeface="Microsoft Uighur"/>
+        <a:font script="Geor" typeface="Sylfaen"/>
       </a:minorFont>
     </a:fontScheme>
     <a:fmtScheme name="Office">
@@ -4349,6 +4024,7 @@
         <a:font script="Mong" typeface="Mongolian Baiti"/>
         <a:font script="Viet" typeface="Times New Roman"/>
         <a:font script="Uigh" typeface="Microsoft Uighur"/>
+        <a:font script="Geor" typeface="Sylfaen"/>
       </a:majorFont>
       <a:minorFont>
         <a:latin typeface="Calibri"/>
@@ -4383,6 +4059,7 @@
         <a:font script="Mong" typeface="Mongolian Baiti"/>
         <a:font script="Viet" typeface="Arial"/>
         <a:font script="Uigh" typeface="Microsoft Uighur"/>
+        <a:font script="Geor" typeface="Sylfaen"/>
       </a:minorFont>
     </a:fontScheme>
     <a:fmtScheme name="Office">

</xml_diff>